<commit_message>
study 2 analysis update
</commit_message>
<xml_diff>
--- a/common_materials/framework.pptx
+++ b/common_materials/framework.pptx
@@ -124,7 +124,7 @@
 <file path=ppt/revisionInfo.xml><?xml version="1.0" encoding="utf-8"?>
 <p1510:revInfo xmlns:a="http://schemas.openxmlformats.org/drawingml/2006/main" xmlns:r="http://schemas.openxmlformats.org/officeDocument/2006/relationships" xmlns:p1510="http://schemas.microsoft.com/office/powerpoint/2015/10/main">
   <p1510:revLst>
-    <p1510:client id="{53A1251E-07E6-42FB-8725-EA9C4EDF47DF}" v="10" dt="2024-07-26T09:56:05.175"/>
+    <p1510:client id="{53A1251E-07E6-42FB-8725-EA9C4EDF47DF}" v="12" dt="2024-08-01T05:41:45.147"/>
   </p1510:revLst>
 </p1510:revInfo>
 </file>
@@ -2085,7 +2085,7 @@
   <pc:docChgLst>
     <pc:chgData name="Ryo Suhara" userId="2d319992da703ee6" providerId="LiveId" clId="{53A1251E-07E6-42FB-8725-EA9C4EDF47DF}"/>
     <pc:docChg chg="custSel modSld">
-      <pc:chgData name="Ryo Suhara" userId="2d319992da703ee6" providerId="LiveId" clId="{53A1251E-07E6-42FB-8725-EA9C4EDF47DF}" dt="2024-07-26T09:56:43.598" v="56" actId="478"/>
+      <pc:chgData name="Ryo Suhara" userId="2d319992da703ee6" providerId="LiveId" clId="{53A1251E-07E6-42FB-8725-EA9C4EDF47DF}" dt="2024-08-01T05:41:46.419" v="68" actId="21"/>
       <pc:docMkLst>
         <pc:docMk/>
       </pc:docMkLst>
@@ -2270,18 +2270,58 @@
           </ac:picMkLst>
         </pc:picChg>
       </pc:sldChg>
-      <pc:sldChg chg="addSp delSp mod">
-        <pc:chgData name="Ryo Suhara" userId="2d319992da703ee6" providerId="LiveId" clId="{53A1251E-07E6-42FB-8725-EA9C4EDF47DF}" dt="2024-07-21T09:21:17.641" v="32" actId="21"/>
+      <pc:sldChg chg="addSp delSp modSp mod">
+        <pc:chgData name="Ryo Suhara" userId="2d319992da703ee6" providerId="LiveId" clId="{53A1251E-07E6-42FB-8725-EA9C4EDF47DF}" dt="2024-08-01T05:41:46.419" v="68" actId="21"/>
         <pc:sldMkLst>
           <pc:docMk/>
           <pc:sldMk cId="2434214515" sldId="264"/>
         </pc:sldMkLst>
+        <pc:spChg chg="mod">
+          <ac:chgData name="Ryo Suhara" userId="2d319992da703ee6" providerId="LiveId" clId="{53A1251E-07E6-42FB-8725-EA9C4EDF47DF}" dt="2024-08-01T05:41:08.677" v="58" actId="20577"/>
+          <ac:spMkLst>
+            <pc:docMk/>
+            <pc:sldMk cId="2434214515" sldId="264"/>
+            <ac:spMk id="22" creationId="{3EAA291F-9F59-582A-208B-EBD8534B231C}"/>
+          </ac:spMkLst>
+        </pc:spChg>
+        <pc:spChg chg="mod">
+          <ac:chgData name="Ryo Suhara" userId="2d319992da703ee6" providerId="LiveId" clId="{53A1251E-07E6-42FB-8725-EA9C4EDF47DF}" dt="2024-08-01T05:41:19.104" v="64" actId="20577"/>
+          <ac:spMkLst>
+            <pc:docMk/>
+            <pc:sldMk cId="2434214515" sldId="264"/>
+            <ac:spMk id="24" creationId="{3929342C-2504-7339-D8D9-2EDA5AA1D765}"/>
+          </ac:spMkLst>
+        </pc:spChg>
+        <pc:spChg chg="mod">
+          <ac:chgData name="Ryo Suhara" userId="2d319992da703ee6" providerId="LiveId" clId="{53A1251E-07E6-42FB-8725-EA9C4EDF47DF}" dt="2024-08-01T05:41:16.692" v="62" actId="20577"/>
+          <ac:spMkLst>
+            <pc:docMk/>
+            <pc:sldMk cId="2434214515" sldId="264"/>
+            <ac:spMk id="25" creationId="{B2476A3A-E9CE-8BAD-38E8-DCD48C4D2401}"/>
+          </ac:spMkLst>
+        </pc:spChg>
         <pc:picChg chg="add del">
           <ac:chgData name="Ryo Suhara" userId="2d319992da703ee6" providerId="LiveId" clId="{53A1251E-07E6-42FB-8725-EA9C4EDF47DF}" dt="2024-07-21T09:21:17.641" v="32" actId="21"/>
           <ac:picMkLst>
             <pc:docMk/>
             <pc:sldMk cId="2434214515" sldId="264"/>
             <ac:picMk id="4" creationId="{4AEA68AA-AF69-5BE1-9916-B88DF384BB26}"/>
+          </ac:picMkLst>
+        </pc:picChg>
+        <pc:picChg chg="add del">
+          <ac:chgData name="Ryo Suhara" userId="2d319992da703ee6" providerId="LiveId" clId="{53A1251E-07E6-42FB-8725-EA9C4EDF47DF}" dt="2024-08-01T05:41:29.388" v="66" actId="21"/>
+          <ac:picMkLst>
+            <pc:docMk/>
+            <pc:sldMk cId="2434214515" sldId="264"/>
+            <ac:picMk id="4" creationId="{F55EC18A-2996-D84A-09A7-1760177D3451}"/>
+          </ac:picMkLst>
+        </pc:picChg>
+        <pc:picChg chg="add del">
+          <ac:chgData name="Ryo Suhara" userId="2d319992da703ee6" providerId="LiveId" clId="{53A1251E-07E6-42FB-8725-EA9C4EDF47DF}" dt="2024-08-01T05:41:46.419" v="68" actId="21"/>
+          <ac:picMkLst>
+            <pc:docMk/>
+            <pc:sldMk cId="2434214515" sldId="264"/>
+            <ac:picMk id="5" creationId="{DC51CDF6-B0F9-6EEF-4529-5540066E0F90}"/>
           </ac:picMkLst>
         </pc:picChg>
       </pc:sldChg>
@@ -2372,7 +2412,7 @@
           <a:p>
             <a:fld id="{BF187CE6-48E4-4866-A94A-1C6CA4E16E8A}" type="datetimeFigureOut">
               <a:rPr kumimoji="1" lang="ja-JP" altLang="en-US" smtClean="0"/>
-              <a:t>2024/7/26</a:t>
+              <a:t>2024/8/1</a:t>
             </a:fld>
             <a:endParaRPr kumimoji="1" lang="ja-JP" altLang="en-US"/>
           </a:p>
@@ -3209,7 +3249,7 @@
           <a:p>
             <a:fld id="{0A61B77B-977B-4512-96B9-38DFE5BC94C7}" type="datetimeFigureOut">
               <a:rPr kumimoji="1" lang="ja-JP" altLang="en-US" smtClean="0"/>
-              <a:t>2024/7/26</a:t>
+              <a:t>2024/8/1</a:t>
             </a:fld>
             <a:endParaRPr kumimoji="1" lang="ja-JP" altLang="en-US"/>
           </a:p>
@@ -3409,7 +3449,7 @@
           <a:p>
             <a:fld id="{0A61B77B-977B-4512-96B9-38DFE5BC94C7}" type="datetimeFigureOut">
               <a:rPr kumimoji="1" lang="ja-JP" altLang="en-US" smtClean="0"/>
-              <a:t>2024/7/26</a:t>
+              <a:t>2024/8/1</a:t>
             </a:fld>
             <a:endParaRPr kumimoji="1" lang="ja-JP" altLang="en-US"/>
           </a:p>
@@ -3619,7 +3659,7 @@
           <a:p>
             <a:fld id="{0A61B77B-977B-4512-96B9-38DFE5BC94C7}" type="datetimeFigureOut">
               <a:rPr kumimoji="1" lang="ja-JP" altLang="en-US" smtClean="0"/>
-              <a:t>2024/7/26</a:t>
+              <a:t>2024/8/1</a:t>
             </a:fld>
             <a:endParaRPr kumimoji="1" lang="ja-JP" altLang="en-US"/>
           </a:p>
@@ -3819,7 +3859,7 @@
           <a:p>
             <a:fld id="{0A61B77B-977B-4512-96B9-38DFE5BC94C7}" type="datetimeFigureOut">
               <a:rPr kumimoji="1" lang="ja-JP" altLang="en-US" smtClean="0"/>
-              <a:t>2024/7/26</a:t>
+              <a:t>2024/8/1</a:t>
             </a:fld>
             <a:endParaRPr kumimoji="1" lang="ja-JP" altLang="en-US"/>
           </a:p>
@@ -4095,7 +4135,7 @@
           <a:p>
             <a:fld id="{0A61B77B-977B-4512-96B9-38DFE5BC94C7}" type="datetimeFigureOut">
               <a:rPr kumimoji="1" lang="ja-JP" altLang="en-US" smtClean="0"/>
-              <a:t>2024/7/26</a:t>
+              <a:t>2024/8/1</a:t>
             </a:fld>
             <a:endParaRPr kumimoji="1" lang="ja-JP" altLang="en-US"/>
           </a:p>
@@ -4363,7 +4403,7 @@
           <a:p>
             <a:fld id="{0A61B77B-977B-4512-96B9-38DFE5BC94C7}" type="datetimeFigureOut">
               <a:rPr kumimoji="1" lang="ja-JP" altLang="en-US" smtClean="0"/>
-              <a:t>2024/7/26</a:t>
+              <a:t>2024/8/1</a:t>
             </a:fld>
             <a:endParaRPr kumimoji="1" lang="ja-JP" altLang="en-US"/>
           </a:p>
@@ -4778,7 +4818,7 @@
           <a:p>
             <a:fld id="{0A61B77B-977B-4512-96B9-38DFE5BC94C7}" type="datetimeFigureOut">
               <a:rPr kumimoji="1" lang="ja-JP" altLang="en-US" smtClean="0"/>
-              <a:t>2024/7/26</a:t>
+              <a:t>2024/8/1</a:t>
             </a:fld>
             <a:endParaRPr kumimoji="1" lang="ja-JP" altLang="en-US"/>
           </a:p>
@@ -4920,7 +4960,7 @@
           <a:p>
             <a:fld id="{0A61B77B-977B-4512-96B9-38DFE5BC94C7}" type="datetimeFigureOut">
               <a:rPr kumimoji="1" lang="ja-JP" altLang="en-US" smtClean="0"/>
-              <a:t>2024/7/26</a:t>
+              <a:t>2024/8/1</a:t>
             </a:fld>
             <a:endParaRPr kumimoji="1" lang="ja-JP" altLang="en-US"/>
           </a:p>
@@ -5033,7 +5073,7 @@
           <a:p>
             <a:fld id="{0A61B77B-977B-4512-96B9-38DFE5BC94C7}" type="datetimeFigureOut">
               <a:rPr kumimoji="1" lang="ja-JP" altLang="en-US" smtClean="0"/>
-              <a:t>2024/7/26</a:t>
+              <a:t>2024/8/1</a:t>
             </a:fld>
             <a:endParaRPr kumimoji="1" lang="ja-JP" altLang="en-US"/>
           </a:p>
@@ -5346,7 +5386,7 @@
           <a:p>
             <a:fld id="{0A61B77B-977B-4512-96B9-38DFE5BC94C7}" type="datetimeFigureOut">
               <a:rPr kumimoji="1" lang="ja-JP" altLang="en-US" smtClean="0"/>
-              <a:t>2024/7/26</a:t>
+              <a:t>2024/8/1</a:t>
             </a:fld>
             <a:endParaRPr kumimoji="1" lang="ja-JP" altLang="en-US"/>
           </a:p>
@@ -5635,7 +5675,7 @@
           <a:p>
             <a:fld id="{0A61B77B-977B-4512-96B9-38DFE5BC94C7}" type="datetimeFigureOut">
               <a:rPr kumimoji="1" lang="ja-JP" altLang="en-US" smtClean="0"/>
-              <a:t>2024/7/26</a:t>
+              <a:t>2024/8/1</a:t>
             </a:fld>
             <a:endParaRPr kumimoji="1" lang="ja-JP" altLang="en-US"/>
           </a:p>
@@ -5878,7 +5918,7 @@
           <a:p>
             <a:fld id="{0A61B77B-977B-4512-96B9-38DFE5BC94C7}" type="datetimeFigureOut">
               <a:rPr kumimoji="1" lang="ja-JP" altLang="en-US" smtClean="0"/>
-              <a:t>2024/7/26</a:t>
+              <a:t>2024/8/1</a:t>
             </a:fld>
             <a:endParaRPr kumimoji="1" lang="ja-JP" altLang="en-US"/>
           </a:p>
@@ -12056,7 +12096,7 @@
                 <a:ea typeface="Calibri" panose="020F0502020204030204" pitchFamily="34" charset="0"/>
                 <a:cs typeface="Calibri" panose="020F0502020204030204" pitchFamily="34" charset="0"/>
               </a:rPr>
-              <a:t>H7.1</a:t>
+              <a:t>H5.1</a:t>
             </a:r>
             <a:endParaRPr kumimoji="1" lang="ja-JP" altLang="en-US" dirty="0">
               <a:solidFill>
@@ -12105,7 +12145,29 @@
                 <a:ea typeface="Calibri" panose="020F0502020204030204" pitchFamily="34" charset="0"/>
                 <a:cs typeface="Calibri" panose="020F0502020204030204" pitchFamily="34" charset="0"/>
               </a:rPr>
-              <a:t>H7.2</a:t>
+              <a:t>H</a:t>
+            </a:r>
+            <a:r>
+              <a:rPr lang="en-US" altLang="ja-JP" dirty="0">
+                <a:solidFill>
+                  <a:srgbClr val="0000FF"/>
+                </a:solidFill>
+                <a:latin typeface="Calibri" panose="020F0502020204030204" pitchFamily="34" charset="0"/>
+                <a:ea typeface="Calibri" panose="020F0502020204030204" pitchFamily="34" charset="0"/>
+                <a:cs typeface="Calibri" panose="020F0502020204030204" pitchFamily="34" charset="0"/>
+              </a:rPr>
+              <a:t>5</a:t>
+            </a:r>
+            <a:r>
+              <a:rPr kumimoji="1" lang="en-US" altLang="ja-JP" dirty="0">
+                <a:solidFill>
+                  <a:srgbClr val="0000FF"/>
+                </a:solidFill>
+                <a:latin typeface="Calibri" panose="020F0502020204030204" pitchFamily="34" charset="0"/>
+                <a:ea typeface="Calibri" panose="020F0502020204030204" pitchFamily="34" charset="0"/>
+                <a:cs typeface="Calibri" panose="020F0502020204030204" pitchFamily="34" charset="0"/>
+              </a:rPr>
+              <a:t>.2</a:t>
             </a:r>
             <a:endParaRPr kumimoji="1" lang="ja-JP" altLang="en-US" dirty="0">
               <a:solidFill>
@@ -12154,7 +12216,7 @@
                 <a:ea typeface="Calibri" panose="020F0502020204030204" pitchFamily="34" charset="0"/>
                 <a:cs typeface="Calibri" panose="020F0502020204030204" pitchFamily="34" charset="0"/>
               </a:rPr>
-              <a:t>H7.3</a:t>
+              <a:t>H5.3</a:t>
             </a:r>
             <a:endParaRPr kumimoji="1" lang="ja-JP" altLang="en-US" dirty="0">
               <a:solidFill>

</xml_diff>